<commit_message>
fastapi and server calls
Signed-off-by: Shubham Tiwari <shubht3303@gmail.com>
</commit_message>
<xml_diff>
--- a/src/docs/MiniProject.pptx
+++ b/src/docs/MiniProject.pptx
@@ -461,7 +461,7 @@
             <a:fld id="{B61BEF0D-F0BB-DE4B-95CE-6DB70DBA9567}" type="datetimeFigureOut">
               <a:rPr lang="en-US" dirty="0"/>
               <a:pPr/>
-              <a:t>10/22/2023</a:t>
+              <a:t>11/5/2023</a:t>
             </a:fld>
             <a:endParaRPr lang="en-US" dirty="0"/>
           </a:p>
@@ -787,7 +787,7 @@
             <a:fld id="{B61BEF0D-F0BB-DE4B-95CE-6DB70DBA9567}" type="datetimeFigureOut">
               <a:rPr lang="en-US" dirty="0"/>
               <a:pPr/>
-              <a:t>10/22/2023</a:t>
+              <a:t>11/5/2023</a:t>
             </a:fld>
             <a:endParaRPr lang="en-US" dirty="0"/>
           </a:p>
@@ -1037,7 +1037,7 @@
             <a:fld id="{B61BEF0D-F0BB-DE4B-95CE-6DB70DBA9567}" type="datetimeFigureOut">
               <a:rPr lang="en-US" dirty="0"/>
               <a:pPr/>
-              <a:t>10/22/2023</a:t>
+              <a:t>11/5/2023</a:t>
             </a:fld>
             <a:endParaRPr lang="en-US" dirty="0"/>
           </a:p>
@@ -1378,7 +1378,7 @@
             <a:fld id="{B61BEF0D-F0BB-DE4B-95CE-6DB70DBA9567}" type="datetimeFigureOut">
               <a:rPr lang="en-US" dirty="0"/>
               <a:pPr/>
-              <a:t>10/22/2023</a:t>
+              <a:t>11/5/2023</a:t>
             </a:fld>
             <a:endParaRPr lang="en-US" dirty="0"/>
           </a:p>
@@ -1727,7 +1727,7 @@
             <a:fld id="{B61BEF0D-F0BB-DE4B-95CE-6DB70DBA9567}" type="datetimeFigureOut">
               <a:rPr lang="en-US" dirty="0"/>
               <a:pPr/>
-              <a:t>10/22/2023</a:t>
+              <a:t>11/5/2023</a:t>
             </a:fld>
             <a:endParaRPr lang="en-US" dirty="0"/>
           </a:p>
@@ -2103,7 +2103,7 @@
             <a:fld id="{B61BEF0D-F0BB-DE4B-95CE-6DB70DBA9567}" type="datetimeFigureOut">
               <a:rPr lang="en-US" dirty="0"/>
               <a:pPr/>
-              <a:t>10/22/2023</a:t>
+              <a:t>11/5/2023</a:t>
             </a:fld>
             <a:endParaRPr lang="en-US" dirty="0"/>
           </a:p>
@@ -2575,7 +2575,7 @@
             <a:fld id="{B61BEF0D-F0BB-DE4B-95CE-6DB70DBA9567}" type="datetimeFigureOut">
               <a:rPr lang="en-US" dirty="0"/>
               <a:pPr/>
-              <a:t>10/22/2023</a:t>
+              <a:t>11/5/2023</a:t>
             </a:fld>
             <a:endParaRPr lang="en-US" dirty="0"/>
           </a:p>
@@ -2787,7 +2787,7 @@
             <a:fld id="{B61BEF0D-F0BB-DE4B-95CE-6DB70DBA9567}" type="datetimeFigureOut">
               <a:rPr lang="en-US" dirty="0"/>
               <a:pPr/>
-              <a:t>10/22/2023</a:t>
+              <a:t>11/5/2023</a:t>
             </a:fld>
             <a:endParaRPr lang="en-US" dirty="0"/>
           </a:p>
@@ -3000,7 +3000,7 @@
             <a:fld id="{B61BEF0D-F0BB-DE4B-95CE-6DB70DBA9567}" type="datetimeFigureOut">
               <a:rPr lang="en-US" dirty="0"/>
               <a:pPr/>
-              <a:t>10/22/2023</a:t>
+              <a:t>11/5/2023</a:t>
             </a:fld>
             <a:endParaRPr lang="en-US" dirty="0"/>
           </a:p>
@@ -3233,7 +3233,7 @@
           <a:p>
             <a:fld id="{05BFA754-D5C3-4E66-96A6-867B257F58DC}" type="datetimeFigureOut">
               <a:rPr lang="en-US" dirty="0"/>
-              <a:t>10/22/2023</a:t>
+              <a:t>11/5/2023</a:t>
             </a:fld>
             <a:endParaRPr lang="en-US" dirty="0"/>
           </a:p>
@@ -3482,7 +3482,7 @@
             <a:fld id="{B61BEF0D-F0BB-DE4B-95CE-6DB70DBA9567}" type="datetimeFigureOut">
               <a:rPr lang="en-US" dirty="0"/>
               <a:pPr/>
-              <a:t>10/22/2023</a:t>
+              <a:t>11/5/2023</a:t>
             </a:fld>
             <a:endParaRPr lang="en-US" dirty="0"/>
           </a:p>
@@ -3786,7 +3786,7 @@
           <a:p>
             <a:fld id="{05BFA754-D5C3-4E66-96A6-867B257F58DC}" type="datetimeFigureOut">
               <a:rPr lang="en-US" dirty="0"/>
-              <a:t>10/22/2023</a:t>
+              <a:t>11/5/2023</a:t>
             </a:fld>
             <a:endParaRPr lang="en-US" dirty="0"/>
           </a:p>
@@ -4169,7 +4169,7 @@
             <a:fld id="{B61BEF0D-F0BB-DE4B-95CE-6DB70DBA9567}" type="datetimeFigureOut">
               <a:rPr lang="en-US" dirty="0"/>
               <a:pPr/>
-              <a:t>10/22/2023</a:t>
+              <a:t>11/5/2023</a:t>
             </a:fld>
             <a:endParaRPr lang="en-US" dirty="0"/>
           </a:p>
@@ -4325,7 +4325,7 @@
             <a:fld id="{B61BEF0D-F0BB-DE4B-95CE-6DB70DBA9567}" type="datetimeFigureOut">
               <a:rPr lang="en-US" dirty="0"/>
               <a:pPr/>
-              <a:t>10/22/2023</a:t>
+              <a:t>11/5/2023</a:t>
             </a:fld>
             <a:endParaRPr lang="en-US" dirty="0"/>
           </a:p>
@@ -4453,7 +4453,7 @@
             <a:fld id="{B61BEF0D-F0BB-DE4B-95CE-6DB70DBA9567}" type="datetimeFigureOut">
               <a:rPr lang="en-US" dirty="0"/>
               <a:pPr/>
-              <a:t>10/22/2023</a:t>
+              <a:t>11/5/2023</a:t>
             </a:fld>
             <a:endParaRPr lang="en-US" dirty="0"/>
           </a:p>
@@ -4710,7 +4710,7 @@
             <a:fld id="{B61BEF0D-F0BB-DE4B-95CE-6DB70DBA9567}" type="datetimeFigureOut">
               <a:rPr lang="en-US" dirty="0"/>
               <a:pPr/>
-              <a:t>10/22/2023</a:t>
+              <a:t>11/5/2023</a:t>
             </a:fld>
             <a:endParaRPr lang="en-US" dirty="0"/>
           </a:p>
@@ -5026,7 +5026,7 @@
             <a:fld id="{B61BEF0D-F0BB-DE4B-95CE-6DB70DBA9567}" type="datetimeFigureOut">
               <a:rPr lang="en-US" dirty="0"/>
               <a:pPr/>
-              <a:t>10/22/2023</a:t>
+              <a:t>11/5/2023</a:t>
             </a:fld>
             <a:endParaRPr lang="en-US" dirty="0"/>
           </a:p>
@@ -5379,7 +5379,7 @@
             <a:fld id="{B61BEF0D-F0BB-DE4B-95CE-6DB70DBA9567}" type="datetimeFigureOut">
               <a:rPr lang="en-US" dirty="0"/>
               <a:pPr/>
-              <a:t>10/22/2023</a:t>
+              <a:t>11/5/2023</a:t>
             </a:fld>
             <a:endParaRPr lang="en-US" dirty="0"/>
           </a:p>
@@ -12616,11 +12616,18 @@
               <a:buChar char="v"/>
             </a:pPr>
             <a:r>
+              <a:rPr lang="en-GB" sz="1600" b="1">
+                <a:latin typeface="Times New Roman" panose="02020603050405020304" pitchFamily="18" charset="0"/>
+                <a:cs typeface="Times New Roman" panose="02020603050405020304" pitchFamily="18" charset="0"/>
+              </a:rPr>
+              <a:t>Skills </a:t>
+            </a:r>
+            <a:r>
               <a:rPr lang="en-GB" sz="1600" b="1" dirty="0">
                 <a:latin typeface="Times New Roman" panose="02020603050405020304" pitchFamily="18" charset="0"/>
                 <a:cs typeface="Times New Roman" panose="02020603050405020304" pitchFamily="18" charset="0"/>
               </a:rPr>
-              <a:t>.Skills Enhancement: Campus Connect offers resources for students to enhance their job readiness.</a:t>
+              <a:t>Enhancement: Campus Connect offers resources for students to enhance their job readiness.</a:t>
             </a:r>
           </a:p>
           <a:p>

</xml_diff>